<commit_message>
doc: update user instructions
</commit_message>
<xml_diff>
--- a/spec/应用程序操作指引.pptx
+++ b/spec/应用程序操作指引.pptx
@@ -5,28 +5,29 @@
     <p:sldMasterId id="2147483648" r:id="rId3"/>
   </p:sldMasterIdLst>
   <p:notesMasterIdLst>
-    <p:notesMasterId r:id="rId20"/>
+    <p:notesMasterId r:id="rId21"/>
   </p:notesMasterIdLst>
   <p:handoutMasterIdLst>
-    <p:handoutMasterId r:id="rId21"/>
+    <p:handoutMasterId r:id="rId22"/>
   </p:handoutMasterIdLst>
   <p:sldIdLst>
     <p:sldId id="256" r:id="rId4"/>
     <p:sldId id="259" r:id="rId5"/>
     <p:sldId id="281" r:id="rId6"/>
     <p:sldId id="285" r:id="rId7"/>
-    <p:sldId id="286" r:id="rId8"/>
-    <p:sldId id="287" r:id="rId9"/>
-    <p:sldId id="282" r:id="rId10"/>
-    <p:sldId id="289" r:id="rId11"/>
-    <p:sldId id="290" r:id="rId12"/>
-    <p:sldId id="291" r:id="rId13"/>
-    <p:sldId id="292" r:id="rId14"/>
-    <p:sldId id="284" r:id="rId15"/>
-    <p:sldId id="269" r:id="rId16"/>
-    <p:sldId id="272" r:id="rId17"/>
-    <p:sldId id="274" r:id="rId18"/>
-    <p:sldId id="279" r:id="rId19"/>
+    <p:sldId id="293" r:id="rId8"/>
+    <p:sldId id="286" r:id="rId9"/>
+    <p:sldId id="287" r:id="rId10"/>
+    <p:sldId id="282" r:id="rId11"/>
+    <p:sldId id="289" r:id="rId12"/>
+    <p:sldId id="290" r:id="rId13"/>
+    <p:sldId id="291" r:id="rId14"/>
+    <p:sldId id="292" r:id="rId15"/>
+    <p:sldId id="284" r:id="rId16"/>
+    <p:sldId id="269" r:id="rId17"/>
+    <p:sldId id="272" r:id="rId18"/>
+    <p:sldId id="274" r:id="rId19"/>
+    <p:sldId id="279" r:id="rId20"/>
   </p:sldIdLst>
   <p:sldSz cx="12192000" cy="6858000"/>
   <p:notesSz cx="6858000" cy="9144000"/>
@@ -134,6 +135,7 @@
             <p14:sldId id="259"/>
             <p14:sldId id="281"/>
             <p14:sldId id="285"/>
+            <p14:sldId id="293"/>
             <p14:sldId id="286"/>
             <p14:sldId id="287"/>
             <p14:sldId id="282"/>
@@ -850,12 +852,7 @@
             <p:ph type="sldImg"/>
           </p:nvPr>
         </p:nvSpPr>
-        <p:spPr>
-          <a:xfrm>
-            <a:off x="685800" y="1143000"/>
-            <a:ext cx="5486400" cy="3086100"/>
-          </a:xfrm>
-        </p:spPr>
+        <p:spPr/>
       </p:sp>
       <p:sp>
         <p:nvSpPr>
@@ -867,12 +864,7 @@
             <p:ph type="body" idx="1"/>
           </p:nvPr>
         </p:nvSpPr>
-        <p:spPr>
-          <a:xfrm>
-            <a:off x="685800" y="4400550"/>
-            <a:ext cx="5486400" cy="3600450"/>
-          </a:xfrm>
-        </p:spPr>
+        <p:spPr/>
         <p:txBody>
           <a:bodyPr/>
           <a:lstStyle/>
@@ -891,12 +883,7 @@
             <p:ph type="sldNum" sz="quarter" idx="10"/>
           </p:nvPr>
         </p:nvSpPr>
-        <p:spPr>
-          <a:xfrm>
-            <a:off x="3884613" y="8685213"/>
-            <a:ext cx="2971800" cy="458787"/>
-          </a:xfrm>
-        </p:spPr>
+        <p:spPr/>
         <p:txBody>
           <a:bodyPr/>
           <a:lstStyle/>
@@ -913,7 +900,7 @@
     </p:spTree>
     <p:extLst>
       <p:ext uri="{BB962C8B-B14F-4D97-AF65-F5344CB8AC3E}">
-        <p14:creationId xmlns:p14="http://schemas.microsoft.com/office/powerpoint/2010/main" val="2299458836"/>
+        <p14:creationId xmlns:p14="http://schemas.microsoft.com/office/powerpoint/2010/main" val="848478816"/>
       </p:ext>
     </p:extLst>
   </p:cSld>
@@ -950,7 +937,12 @@
             <p:ph type="sldImg"/>
           </p:nvPr>
         </p:nvSpPr>
-        <p:spPr/>
+        <p:spPr>
+          <a:xfrm>
+            <a:off x="685800" y="1143000"/>
+            <a:ext cx="5486400" cy="3086100"/>
+          </a:xfrm>
+        </p:spPr>
       </p:sp>
       <p:sp>
         <p:nvSpPr>
@@ -962,7 +954,12 @@
             <p:ph type="body" idx="1"/>
           </p:nvPr>
         </p:nvSpPr>
-        <p:spPr/>
+        <p:spPr>
+          <a:xfrm>
+            <a:off x="685800" y="4400550"/>
+            <a:ext cx="5486400" cy="3600450"/>
+          </a:xfrm>
+        </p:spPr>
         <p:txBody>
           <a:bodyPr/>
           <a:lstStyle/>
@@ -981,7 +978,12 @@
             <p:ph type="sldNum" sz="quarter" idx="10"/>
           </p:nvPr>
         </p:nvSpPr>
-        <p:spPr/>
+        <p:spPr>
+          <a:xfrm>
+            <a:off x="3884613" y="8685213"/>
+            <a:ext cx="2971800" cy="458787"/>
+          </a:xfrm>
+        </p:spPr>
         <p:txBody>
           <a:bodyPr/>
           <a:lstStyle/>
@@ -990,6 +992,91 @@
             <a:fld id="{02818732-FA64-4F57-8EE6-57AA70E1F1E0}" type="slidenum">
               <a:rPr lang="en-US" altLang="zh-CN" smtClean="0"/>
               <a:t>16</a:t>
+            </a:fld>
+            <a:endParaRPr lang="zh-CN" altLang="en-US"/>
+          </a:p>
+        </p:txBody>
+      </p:sp>
+    </p:spTree>
+    <p:extLst>
+      <p:ext uri="{BB962C8B-B14F-4D97-AF65-F5344CB8AC3E}">
+        <p14:creationId xmlns:p14="http://schemas.microsoft.com/office/powerpoint/2010/main" val="2299458836"/>
+      </p:ext>
+    </p:extLst>
+  </p:cSld>
+  <p:clrMapOvr>
+    <a:masterClrMapping/>
+  </p:clrMapOvr>
+</p:notes>
+</file>
+
+<file path=ppt/notesSlides/notesSlide12.xml><?xml version="1.0" encoding="utf-8"?>
+<p:notes xmlns:a="http://schemas.openxmlformats.org/drawingml/2006/main" xmlns:r="http://schemas.openxmlformats.org/officeDocument/2006/relationships" xmlns:p="http://schemas.openxmlformats.org/presentationml/2006/main">
+  <p:cSld>
+    <p:spTree>
+      <p:nvGrpSpPr>
+        <p:cNvPr id="1" name=""/>
+        <p:cNvGrpSpPr/>
+        <p:nvPr/>
+      </p:nvGrpSpPr>
+      <p:grpSpPr>
+        <a:xfrm>
+          <a:off x="0" y="0"/>
+          <a:ext cx="0" cy="0"/>
+          <a:chOff x="0" y="0"/>
+          <a:chExt cx="0" cy="0"/>
+        </a:xfrm>
+      </p:grpSpPr>
+      <p:sp>
+        <p:nvSpPr>
+          <p:cNvPr id="2" name="幻灯片图像占位符 1"/>
+          <p:cNvSpPr>
+            <a:spLocks noGrp="1" noRot="1" noChangeAspect="1"/>
+          </p:cNvSpPr>
+          <p:nvPr>
+            <p:ph type="sldImg"/>
+          </p:nvPr>
+        </p:nvSpPr>
+        <p:spPr/>
+      </p:sp>
+      <p:sp>
+        <p:nvSpPr>
+          <p:cNvPr id="3" name="备注占位符 2"/>
+          <p:cNvSpPr>
+            <a:spLocks noGrp="1"/>
+          </p:cNvSpPr>
+          <p:nvPr>
+            <p:ph type="body" idx="1"/>
+          </p:nvPr>
+        </p:nvSpPr>
+        <p:spPr/>
+        <p:txBody>
+          <a:bodyPr/>
+          <a:lstStyle/>
+          <a:p>
+            <a:endParaRPr lang="zh-CN" altLang="en-US"/>
+          </a:p>
+        </p:txBody>
+      </p:sp>
+      <p:sp>
+        <p:nvSpPr>
+          <p:cNvPr id="4" name="灯片编号占位符 3"/>
+          <p:cNvSpPr>
+            <a:spLocks noGrp="1"/>
+          </p:cNvSpPr>
+          <p:nvPr>
+            <p:ph type="sldNum" sz="quarter" idx="10"/>
+          </p:nvPr>
+        </p:nvSpPr>
+        <p:spPr/>
+        <p:txBody>
+          <a:bodyPr/>
+          <a:lstStyle/>
+          <a:p>
+            <a:pPr rtl="0"/>
+            <a:fld id="{02818732-FA64-4F57-8EE6-57AA70E1F1E0}" type="slidenum">
+              <a:rPr lang="en-US" altLang="zh-CN" smtClean="0"/>
+              <a:t>17</a:t>
             </a:fld>
             <a:endParaRPr lang="zh-CN" altLang="en-US"/>
           </a:p>
@@ -1329,7 +1416,7 @@
             <a:pPr rtl="0"/>
             <a:fld id="{02818732-FA64-4F57-8EE6-57AA70E1F1E0}" type="slidenum">
               <a:rPr lang="en-US" altLang="zh-CN" smtClean="0"/>
-              <a:t>7</a:t>
+              <a:t>5</a:t>
             </a:fld>
             <a:endParaRPr lang="zh-CN" altLang="en-US"/>
           </a:p>
@@ -1338,7 +1425,7 @@
     </p:spTree>
     <p:extLst>
       <p:ext uri="{BB962C8B-B14F-4D97-AF65-F5344CB8AC3E}">
-        <p14:creationId xmlns:p14="http://schemas.microsoft.com/office/powerpoint/2010/main" val="223218611"/>
+        <p14:creationId xmlns:p14="http://schemas.microsoft.com/office/powerpoint/2010/main" val="2524865815"/>
       </p:ext>
     </p:extLst>
   </p:cSld>
@@ -1423,7 +1510,7 @@
     </p:spTree>
     <p:extLst>
       <p:ext uri="{BB962C8B-B14F-4D97-AF65-F5344CB8AC3E}">
-        <p14:creationId xmlns:p14="http://schemas.microsoft.com/office/powerpoint/2010/main" val="174493333"/>
+        <p14:creationId xmlns:p14="http://schemas.microsoft.com/office/powerpoint/2010/main" val="223218611"/>
       </p:ext>
     </p:extLst>
   </p:cSld>
@@ -1499,7 +1586,7 @@
             <a:pPr rtl="0"/>
             <a:fld id="{02818732-FA64-4F57-8EE6-57AA70E1F1E0}" type="slidenum">
               <a:rPr lang="en-US" altLang="zh-CN" smtClean="0"/>
-              <a:t>12</a:t>
+              <a:t>9</a:t>
             </a:fld>
             <a:endParaRPr lang="zh-CN" altLang="en-US"/>
           </a:p>
@@ -1508,7 +1595,7 @@
     </p:spTree>
     <p:extLst>
       <p:ext uri="{BB962C8B-B14F-4D97-AF65-F5344CB8AC3E}">
-        <p14:creationId xmlns:p14="http://schemas.microsoft.com/office/powerpoint/2010/main" val="3508688363"/>
+        <p14:creationId xmlns:p14="http://schemas.microsoft.com/office/powerpoint/2010/main" val="174493333"/>
       </p:ext>
     </p:extLst>
   </p:cSld>
@@ -1593,7 +1680,7 @@
     </p:spTree>
     <p:extLst>
       <p:ext uri="{BB962C8B-B14F-4D97-AF65-F5344CB8AC3E}">
-        <p14:creationId xmlns:p14="http://schemas.microsoft.com/office/powerpoint/2010/main" val="332360698"/>
+        <p14:creationId xmlns:p14="http://schemas.microsoft.com/office/powerpoint/2010/main" val="3508688363"/>
       </p:ext>
     </p:extLst>
   </p:cSld>
@@ -1678,7 +1765,7 @@
     </p:spTree>
     <p:extLst>
       <p:ext uri="{BB962C8B-B14F-4D97-AF65-F5344CB8AC3E}">
-        <p14:creationId xmlns:p14="http://schemas.microsoft.com/office/powerpoint/2010/main" val="848478816"/>
+        <p14:creationId xmlns:p14="http://schemas.microsoft.com/office/powerpoint/2010/main" val="332360698"/>
       </p:ext>
     </p:extLst>
   </p:cSld>
@@ -21707,6 +21794,141 @@
           <a:p>
             <a:r>
               <a:rPr lang="zh-CN" altLang="en-US" noProof="1"/>
+              <a:t>粘贴或者拖拽需要分析的已清洗数据文件至：</a:t>
+            </a:r>
+            <a:r>
+              <a:rPr lang="en-US" altLang="zh-CN" noProof="1">
+                <a:hlinkClick r:id="rId2" action="ppaction://hlinkfile"/>
+              </a:rPr>
+              <a:t>\\10.10.3.190\std-inv-report-v8\analysis\cleaned</a:t>
+            </a:r>
+            <a:r>
+              <a:rPr lang="en-US" altLang="zh-CN" noProof="1"/>
+              <a:t> </a:t>
+            </a:r>
+            <a:endParaRPr lang="en-US" dirty="0"/>
+          </a:p>
+        </p:txBody>
+      </p:sp>
+      <p:pic>
+        <p:nvPicPr>
+          <p:cNvPr id="2" name="图片 1">
+            <a:extLst>
+              <a:ext uri="{FF2B5EF4-FFF2-40B4-BE49-F238E27FC236}">
+                <a16:creationId xmlns:a16="http://schemas.microsoft.com/office/drawing/2014/main" id="{82A9AA36-3D3D-47F4-8CD7-8A5F48C67818}"/>
+              </a:ext>
+            </a:extLst>
+          </p:cNvPr>
+          <p:cNvPicPr>
+            <a:picLocks noChangeAspect="1"/>
+          </p:cNvPicPr>
+          <p:nvPr/>
+        </p:nvPicPr>
+        <p:blipFill>
+          <a:blip r:embed="rId3"/>
+          <a:stretch>
+            <a:fillRect/>
+          </a:stretch>
+        </p:blipFill>
+        <p:spPr>
+          <a:xfrm>
+            <a:off x="1298775" y="1660501"/>
+            <a:ext cx="9906000" cy="3810000"/>
+          </a:xfrm>
+          <a:prstGeom prst="rect">
+            <a:avLst/>
+          </a:prstGeom>
+        </p:spPr>
+      </p:pic>
+    </p:spTree>
+    <p:extLst>
+      <p:ext uri="{BB962C8B-B14F-4D97-AF65-F5344CB8AC3E}">
+        <p14:creationId xmlns:p14="http://schemas.microsoft.com/office/powerpoint/2010/main" val="3022294158"/>
+      </p:ext>
+    </p:extLst>
+  </p:cSld>
+  <p:clrMapOvr>
+    <a:masterClrMapping/>
+  </p:clrMapOvr>
+</p:sld>
+</file>
+
+<file path=ppt/slides/slide11.xml><?xml version="1.0" encoding="utf-8"?>
+<p:sld xmlns:a="http://schemas.openxmlformats.org/drawingml/2006/main" xmlns:r="http://schemas.openxmlformats.org/officeDocument/2006/relationships" xmlns:p="http://schemas.openxmlformats.org/presentationml/2006/main" showMasterSp="0">
+  <p:cSld>
+    <p:spTree>
+      <p:nvGrpSpPr>
+        <p:cNvPr id="1" name=""/>
+        <p:cNvGrpSpPr/>
+        <p:nvPr/>
+      </p:nvGrpSpPr>
+      <p:grpSpPr>
+        <a:xfrm>
+          <a:off x="0" y="0"/>
+          <a:ext cx="0" cy="0"/>
+          <a:chOff x="0" y="0"/>
+          <a:chExt cx="0" cy="0"/>
+        </a:xfrm>
+      </p:grpSpPr>
+      <p:sp>
+        <p:nvSpPr>
+          <p:cNvPr id="6" name="灯片编号占位符 5">
+            <a:extLst>
+              <a:ext uri="{FF2B5EF4-FFF2-40B4-BE49-F238E27FC236}">
+                <a16:creationId xmlns:a16="http://schemas.microsoft.com/office/drawing/2014/main" id="{871A3CDD-79E0-4A33-8FED-82CEF7148793}"/>
+              </a:ext>
+            </a:extLst>
+          </p:cNvPr>
+          <p:cNvSpPr>
+            <a:spLocks noGrp="1"/>
+          </p:cNvSpPr>
+          <p:nvPr>
+            <p:ph type="sldNum" sz="quarter" idx="11"/>
+          </p:nvPr>
+        </p:nvSpPr>
+        <p:spPr/>
+        <p:txBody>
+          <a:bodyPr/>
+          <a:lstStyle/>
+          <a:p>
+            <a:pPr rtl="0"/>
+            <a:fld id="{19B51A1E-902D-48AF-9020-955120F399B6}" type="slidenum">
+              <a:rPr lang="en-US" altLang="zh-CN" noProof="0" smtClean="0"/>
+              <a:pPr rtl="0"/>
+              <a:t>11</a:t>
+            </a:fld>
+            <a:endParaRPr lang="zh-CN" altLang="en-US" noProof="0"/>
+          </a:p>
+        </p:txBody>
+      </p:sp>
+      <p:sp>
+        <p:nvSpPr>
+          <p:cNvPr id="9" name="标题 8">
+            <a:extLst>
+              <a:ext uri="{FF2B5EF4-FFF2-40B4-BE49-F238E27FC236}">
+                <a16:creationId xmlns:a16="http://schemas.microsoft.com/office/drawing/2014/main" id="{EDBAD69E-6195-4630-B588-0130453607E8}"/>
+              </a:ext>
+            </a:extLst>
+          </p:cNvPr>
+          <p:cNvSpPr>
+            <a:spLocks noGrp="1"/>
+          </p:cNvSpPr>
+          <p:nvPr>
+            <p:ph type="title"/>
+          </p:nvPr>
+        </p:nvSpPr>
+        <p:spPr>
+          <a:xfrm>
+            <a:off x="426000" y="369310"/>
+            <a:ext cx="11340000" cy="1291191"/>
+          </a:xfrm>
+        </p:spPr>
+        <p:txBody>
+          <a:bodyPr/>
+          <a:lstStyle/>
+          <a:p>
+            <a:r>
+              <a:rPr lang="zh-CN" altLang="en-US" noProof="1"/>
               <a:t>分析结果出现在： </a:t>
             </a:r>
             <a:r>
@@ -21765,7 +21987,7 @@
 </p:sld>
 </file>
 
-<file path=ppt/slides/slide11.xml><?xml version="1.0" encoding="utf-8"?>
+<file path=ppt/slides/slide12.xml><?xml version="1.0" encoding="utf-8"?>
 <p:sld xmlns:a="http://schemas.openxmlformats.org/drawingml/2006/main" xmlns:r="http://schemas.openxmlformats.org/officeDocument/2006/relationships" xmlns:p="http://schemas.openxmlformats.org/presentationml/2006/main" showMasterSp="0">
   <p:cSld>
     <p:spTree>
@@ -21807,7 +22029,7 @@
             <a:fld id="{19B51A1E-902D-48AF-9020-955120F399B6}" type="slidenum">
               <a:rPr lang="en-US" altLang="zh-CN" noProof="0" smtClean="0"/>
               <a:pPr rtl="0"/>
-              <a:t>11</a:t>
+              <a:t>12</a:t>
             </a:fld>
             <a:endParaRPr lang="zh-CN" altLang="en-US" noProof="0"/>
           </a:p>
@@ -21899,7 +22121,7 @@
 </p:sld>
 </file>
 
-<file path=ppt/slides/slide12.xml><?xml version="1.0" encoding="utf-8"?>
+<file path=ppt/slides/slide13.xml><?xml version="1.0" encoding="utf-8"?>
 <p:sld xmlns:a="http://schemas.openxmlformats.org/drawingml/2006/main" xmlns:r="http://schemas.openxmlformats.org/officeDocument/2006/relationships" xmlns:p="http://schemas.openxmlformats.org/presentationml/2006/main" showMasterSp="0">
   <p:cSld>
     <p:spTree>
@@ -22319,7 +22541,7 @@
             <a:fld id="{19B51A1E-902D-48AF-9020-955120F399B6}" type="slidenum">
               <a:rPr lang="en-US" altLang="zh-CN" smtClean="0"/>
               <a:pPr rtl="0"/>
-              <a:t>12</a:t>
+              <a:t>13</a:t>
             </a:fld>
             <a:endParaRPr lang="zh-CN" altLang="en-US" dirty="0"/>
           </a:p>
@@ -22338,7 +22560,7 @@
 </p:sld>
 </file>
 
-<file path=ppt/slides/slide13.xml><?xml version="1.0" encoding="utf-8"?>
+<file path=ppt/slides/slide14.xml><?xml version="1.0" encoding="utf-8"?>
 <p:sld xmlns:a="http://schemas.openxmlformats.org/drawingml/2006/main" xmlns:r="http://schemas.openxmlformats.org/officeDocument/2006/relationships" xmlns:p="http://schemas.openxmlformats.org/presentationml/2006/main" showMasterSp="0">
   <p:cSld>
     <p:spTree>
@@ -22469,7 +22691,7 @@
             <a:fld id="{19B51A1E-902D-48AF-9020-955120F399B6}" type="slidenum">
               <a:rPr lang="en-US" altLang="zh-CN" smtClean="0"/>
               <a:pPr rtl="0"/>
-              <a:t>13</a:t>
+              <a:t>14</a:t>
             </a:fld>
             <a:endParaRPr lang="zh-CN" altLang="en-US" dirty="0"/>
           </a:p>
@@ -22488,7 +22710,7 @@
 </p:sld>
 </file>
 
-<file path=ppt/slides/slide14.xml><?xml version="1.0" encoding="utf-8"?>
+<file path=ppt/slides/slide15.xml><?xml version="1.0" encoding="utf-8"?>
 <p:sld xmlns:a="http://schemas.openxmlformats.org/drawingml/2006/main" xmlns:r="http://schemas.openxmlformats.org/officeDocument/2006/relationships" xmlns:p="http://schemas.openxmlformats.org/presentationml/2006/main" showMasterSp="0">
   <p:cSld>
     <p:spTree>
@@ -23912,7 +24134,7 @@
             <a:fld id="{19B51A1E-902D-48AF-9020-955120F399B6}" type="slidenum">
               <a:rPr lang="en-US" altLang="zh-CN" smtClean="0"/>
               <a:pPr rtl="0"/>
-              <a:t>14</a:t>
+              <a:t>15</a:t>
             </a:fld>
             <a:endParaRPr lang="zh-CN" altLang="en-US" dirty="0"/>
           </a:p>
@@ -23931,7 +24153,7 @@
 </p:sld>
 </file>
 
-<file path=ppt/slides/slide15.xml><?xml version="1.0" encoding="utf-8"?>
+<file path=ppt/slides/slide16.xml><?xml version="1.0" encoding="utf-8"?>
 <p:sld xmlns:a="http://schemas.openxmlformats.org/drawingml/2006/main" xmlns:r="http://schemas.openxmlformats.org/officeDocument/2006/relationships" xmlns:p="http://schemas.openxmlformats.org/presentationml/2006/main" showMasterSp="0">
   <p:cSld>
     <p:spTree>
@@ -25240,7 +25462,7 @@
             <a:fld id="{19B51A1E-902D-48AF-9020-955120F399B6}" type="slidenum">
               <a:rPr lang="en-US" altLang="zh-CN" smtClean="0"/>
               <a:pPr rtl="0"/>
-              <a:t>15</a:t>
+              <a:t>16</a:t>
             </a:fld>
             <a:endParaRPr lang="zh-CN" altLang="en-US"/>
           </a:p>
@@ -25259,7 +25481,7 @@
 </p:sld>
 </file>
 
-<file path=ppt/slides/slide16.xml><?xml version="1.0" encoding="utf-8"?>
+<file path=ppt/slides/slide17.xml><?xml version="1.0" encoding="utf-8"?>
 <p:sld xmlns:a="http://schemas.openxmlformats.org/drawingml/2006/main" xmlns:r="http://schemas.openxmlformats.org/officeDocument/2006/relationships" xmlns:p="http://schemas.openxmlformats.org/presentationml/2006/main">
   <p:cSld>
     <p:spTree>
@@ -27014,15 +27236,7 @@
             <a:pPr rtl="0"/>
             <a:r>
               <a:rPr lang="zh-CN" altLang="en-US" dirty="0"/>
-              <a:t>数据清洗 </a:t>
-            </a:r>
-            <a:r>
-              <a:rPr lang="en-US" altLang="zh-CN" dirty="0"/>
-              <a:t>– </a:t>
-            </a:r>
-            <a:r>
-              <a:rPr lang="zh-CN" altLang="en-US" dirty="0"/>
-              <a:t>操作步骤</a:t>
+              <a:t>原始调查数据文件格式要求</a:t>
             </a:r>
           </a:p>
         </p:txBody>
@@ -27054,63 +27268,139 @@
           <a:lstStyle/>
           <a:p>
             <a:r>
-              <a:rPr lang="zh-CN" altLang="en-US" sz="2800" noProof="1"/>
-              <a:t>打开共享目录：</a:t>
-            </a:r>
-            <a:r>
-              <a:rPr lang="en-US" altLang="zh-CN" sz="2800" noProof="1">
-                <a:hlinkClick r:id="rId3" action="ppaction://hlinkfile"/>
-              </a:rPr>
-              <a:t>\\10.10.3.190\std-inv-report-v8\cleanse\raw</a:t>
-            </a:r>
-            <a:r>
-              <a:rPr lang="en-US" altLang="zh-CN" sz="2800" noProof="1"/>
-              <a:t> </a:t>
-            </a:r>
-          </a:p>
-          <a:p>
-            <a:pPr rtl="0"/>
-            <a:r>
-              <a:rPr lang="zh-CN" altLang="en-US" sz="2800" noProof="1"/>
-              <a:t>粘贴或者拖拽需要清洗的原始调查数据文件至上述目录</a:t>
-            </a:r>
-            <a:endParaRPr lang="en-US" altLang="zh-CN" sz="2800" noProof="1"/>
-          </a:p>
-          <a:p>
-            <a:pPr rtl="0"/>
-            <a:r>
-              <a:rPr lang="zh-CN" altLang="en-US" sz="2800" noProof="1"/>
-              <a:t>等待约</a:t>
-            </a:r>
-            <a:r>
-              <a:rPr lang="en-US" altLang="zh-CN" sz="2800" noProof="1"/>
+              <a:rPr lang="en-US" altLang="zh-CN" sz="2400" noProof="1"/>
+              <a:t>Excel 2010</a:t>
+            </a:r>
+            <a:r>
+              <a:rPr lang="zh-CN" altLang="en-US" sz="2400" noProof="1"/>
+              <a:t>及以后的版本保存的</a:t>
+            </a:r>
+            <a:r>
+              <a:rPr lang="en-US" altLang="zh-CN" sz="2400" noProof="1"/>
+              <a:t>xlsx</a:t>
+            </a:r>
+            <a:r>
+              <a:rPr lang="zh-CN" altLang="en-US" sz="2400" noProof="1"/>
+              <a:t>文件</a:t>
+            </a:r>
+            <a:endParaRPr lang="en-US" altLang="zh-CN" sz="2400" noProof="1"/>
+          </a:p>
+          <a:p>
+            <a:r>
+              <a:rPr lang="zh-CN" altLang="en-US" sz="2400" noProof="1"/>
+              <a:t>数据列数需 </a:t>
+            </a:r>
+            <a:r>
+              <a:rPr lang="en-US" altLang="zh-CN" sz="2400" noProof="1"/>
+              <a:t>&gt;= 231</a:t>
+            </a:r>
+          </a:p>
+          <a:p>
+            <a:r>
+              <a:rPr lang="en-US" altLang="zh-CN" sz="2400" noProof="1"/>
+              <a:t>A1</a:t>
+            </a:r>
+            <a:r>
+              <a:rPr lang="zh-CN" altLang="en-US" sz="2400" noProof="1"/>
+              <a:t>题之前（左侧）为调研对象基本信息（目前为</a:t>
+            </a:r>
+            <a:r>
+              <a:rPr lang="en-US" altLang="zh-CN" sz="2400" noProof="1"/>
+              <a:t>23</a:t>
+            </a:r>
+            <a:r>
+              <a:rPr lang="zh-CN" altLang="en-US" sz="2400" noProof="1"/>
+              <a:t>列，可增加）</a:t>
+            </a:r>
+            <a:endParaRPr lang="en-US" altLang="zh-CN" sz="2400" noProof="1"/>
+          </a:p>
+          <a:p>
+            <a:r>
+              <a:rPr lang="zh-CN" altLang="en-US" sz="2400" noProof="1"/>
+              <a:t>从</a:t>
+            </a:r>
+            <a:r>
+              <a:rPr lang="en-US" altLang="zh-CN" sz="2400" noProof="1"/>
+              <a:t>A1</a:t>
+            </a:r>
+            <a:r>
+              <a:rPr lang="zh-CN" altLang="en-US" sz="2400" noProof="1"/>
+              <a:t>列起往后（右侧）为调查问题之答案</a:t>
+            </a:r>
+            <a:endParaRPr lang="en-US" altLang="zh-CN" sz="2400" noProof="1"/>
+          </a:p>
+          <a:p>
+            <a:r>
+              <a:rPr lang="zh-CN" altLang="en-US" sz="2400" noProof="1"/>
+              <a:t>数据行需 </a:t>
+            </a:r>
+            <a:r>
+              <a:rPr lang="en-US" altLang="zh-CN" sz="2400" noProof="1"/>
+              <a:t>&gt;= 4</a:t>
+            </a:r>
+          </a:p>
+          <a:p>
+            <a:r>
+              <a:rPr lang="zh-CN" altLang="en-US" sz="2400" noProof="1"/>
+              <a:t>前</a:t>
+            </a:r>
+            <a:r>
+              <a:rPr lang="en-US" altLang="zh-CN" sz="2400" noProof="1"/>
               <a:t>3</a:t>
             </a:r>
             <a:r>
-              <a:rPr lang="zh-CN" altLang="en-US" sz="2800" noProof="1"/>
-              <a:t>分钟</a:t>
-            </a:r>
-            <a:endParaRPr lang="en-US" altLang="zh-CN" sz="2800" noProof="1"/>
-          </a:p>
-          <a:p>
-            <a:r>
-              <a:rPr lang="zh-CN" altLang="en-US" sz="2800" noProof="1"/>
-              <a:t>清洗后的文件将会出现在： </a:t>
-            </a:r>
-            <a:r>
-              <a:rPr lang="en-US" altLang="zh-CN" sz="2800" noProof="1">
-                <a:hlinkClick r:id="rId4" action="ppaction://hlinkfile"/>
-              </a:rPr>
-              <a:t>\\10.10.3.190\std-inv-report-v8\cleanse\cleaned</a:t>
-            </a:r>
-            <a:r>
-              <a:rPr lang="en-US" altLang="zh-CN" sz="2800" noProof="1"/>
-              <a:t> </a:t>
-            </a:r>
-          </a:p>
-          <a:p>
-            <a:pPr rtl="0"/>
-            <a:endParaRPr lang="en-US" altLang="zh-CN" noProof="1"/>
+              <a:rPr lang="zh-CN" altLang="en-US" sz="2400" noProof="1"/>
+              <a:t>行为表头</a:t>
+            </a:r>
+            <a:endParaRPr lang="en-US" altLang="zh-CN" sz="2400" noProof="1"/>
+          </a:p>
+          <a:p>
+            <a:pPr lvl="1"/>
+            <a:r>
+              <a:rPr lang="zh-CN" altLang="en-US" sz="1400" noProof="1"/>
+              <a:t>行</a:t>
+            </a:r>
+            <a:r>
+              <a:rPr lang="en-US" altLang="zh-CN" sz="1400" noProof="1"/>
+              <a:t>1</a:t>
+            </a:r>
+            <a:r>
+              <a:rPr lang="zh-CN" altLang="en-US" sz="1400" noProof="1"/>
+              <a:t>：题目编号（清洗中会对空白单元自动编号）</a:t>
+            </a:r>
+            <a:endParaRPr lang="en-US" altLang="zh-CN" sz="1400" noProof="1"/>
+          </a:p>
+          <a:p>
+            <a:pPr lvl="1"/>
+            <a:r>
+              <a:rPr lang="zh-CN" altLang="en-US" sz="1400" noProof="1"/>
+              <a:t>行</a:t>
+            </a:r>
+            <a:r>
+              <a:rPr lang="en-US" altLang="zh-CN" sz="1400" noProof="1"/>
+              <a:t>2</a:t>
+            </a:r>
+            <a:r>
+              <a:rPr lang="zh-CN" altLang="en-US" sz="1400" noProof="1"/>
+              <a:t>：标题 （清洗中会被移除）</a:t>
+            </a:r>
+            <a:endParaRPr lang="en-US" altLang="zh-CN" sz="1400" noProof="1"/>
+          </a:p>
+          <a:p>
+            <a:pPr lvl="1"/>
+            <a:r>
+              <a:rPr lang="zh-CN" altLang="en-US" sz="1400" noProof="1"/>
+              <a:t>行</a:t>
+            </a:r>
+            <a:r>
+              <a:rPr lang="en-US" altLang="zh-CN" sz="1400" noProof="1"/>
+              <a:t>3</a:t>
+            </a:r>
+            <a:r>
+              <a:rPr lang="zh-CN" altLang="en-US" sz="1400" noProof="1"/>
+              <a:t>：子标题（清洗中会被移除）</a:t>
+            </a:r>
+            <a:endParaRPr lang="en-US" altLang="zh-CN" sz="1400" noProof="1"/>
           </a:p>
           <a:p>
             <a:pPr rtl="0"/>
@@ -27167,6 +27457,199 @@
 </file>
 
 <file path=ppt/slides/slide5.xml><?xml version="1.0" encoding="utf-8"?>
+<p:sld xmlns:a="http://schemas.openxmlformats.org/drawingml/2006/main" xmlns:r="http://schemas.openxmlformats.org/officeDocument/2006/relationships" xmlns:p="http://schemas.openxmlformats.org/presentationml/2006/main">
+  <p:cSld>
+    <p:spTree>
+      <p:nvGrpSpPr>
+        <p:cNvPr id="1" name=""/>
+        <p:cNvGrpSpPr/>
+        <p:nvPr/>
+      </p:nvGrpSpPr>
+      <p:grpSpPr>
+        <a:xfrm>
+          <a:off x="0" y="0"/>
+          <a:ext cx="0" cy="0"/>
+          <a:chOff x="0" y="0"/>
+          <a:chExt cx="0" cy="0"/>
+        </a:xfrm>
+      </p:grpSpPr>
+      <p:sp>
+        <p:nvSpPr>
+          <p:cNvPr id="2" name="标题 1">
+            <a:extLst>
+              <a:ext uri="{FF2B5EF4-FFF2-40B4-BE49-F238E27FC236}">
+                <a16:creationId xmlns:a16="http://schemas.microsoft.com/office/drawing/2014/main" id="{30A3821A-C065-4C9A-A138-F7EC9FCB22BC}"/>
+              </a:ext>
+            </a:extLst>
+          </p:cNvPr>
+          <p:cNvSpPr>
+            <a:spLocks noGrp="1"/>
+          </p:cNvSpPr>
+          <p:nvPr>
+            <p:ph type="title"/>
+          </p:nvPr>
+        </p:nvSpPr>
+        <p:spPr/>
+        <p:txBody>
+          <a:bodyPr rtlCol="0"/>
+          <a:lstStyle/>
+          <a:p>
+            <a:pPr rtl="0"/>
+            <a:r>
+              <a:rPr lang="zh-CN" altLang="en-US" dirty="0"/>
+              <a:t>数据清洗 </a:t>
+            </a:r>
+            <a:r>
+              <a:rPr lang="en-US" altLang="zh-CN" dirty="0"/>
+              <a:t>– </a:t>
+            </a:r>
+            <a:r>
+              <a:rPr lang="zh-CN" altLang="en-US" dirty="0"/>
+              <a:t>操作步骤</a:t>
+            </a:r>
+          </a:p>
+        </p:txBody>
+      </p:sp>
+      <p:sp>
+        <p:nvSpPr>
+          <p:cNvPr id="4" name="内容占位符 3">
+            <a:extLst>
+              <a:ext uri="{FF2B5EF4-FFF2-40B4-BE49-F238E27FC236}">
+                <a16:creationId xmlns:a16="http://schemas.microsoft.com/office/drawing/2014/main" id="{23E57B19-FD04-41F8-BAD3-71E46BBEA649}"/>
+              </a:ext>
+            </a:extLst>
+          </p:cNvPr>
+          <p:cNvSpPr>
+            <a:spLocks noGrp="1"/>
+          </p:cNvSpPr>
+          <p:nvPr>
+            <p:ph sz="half" idx="2"/>
+          </p:nvPr>
+        </p:nvSpPr>
+        <p:spPr>
+          <a:xfrm>
+            <a:off x="432000" y="1241947"/>
+            <a:ext cx="11340000" cy="3462172"/>
+          </a:xfrm>
+        </p:spPr>
+        <p:txBody>
+          <a:bodyPr rtlCol="0"/>
+          <a:lstStyle/>
+          <a:p>
+            <a:r>
+              <a:rPr lang="zh-CN" altLang="en-US" sz="2800" noProof="1"/>
+              <a:t>打开共享目录：</a:t>
+            </a:r>
+            <a:r>
+              <a:rPr lang="en-US" altLang="zh-CN" sz="2800" noProof="1">
+                <a:hlinkClick r:id="rId3" action="ppaction://hlinkfile"/>
+              </a:rPr>
+              <a:t>\\10.10.3.190\std-inv-report-v8\cleanse\raw</a:t>
+            </a:r>
+            <a:r>
+              <a:rPr lang="en-US" altLang="zh-CN" sz="2800" noProof="1"/>
+              <a:t> </a:t>
+            </a:r>
+          </a:p>
+          <a:p>
+            <a:pPr rtl="0"/>
+            <a:r>
+              <a:rPr lang="zh-CN" altLang="en-US" sz="2800" noProof="1"/>
+              <a:t>粘贴或者拖拽需要清洗的原始调查数据文件至上述目录</a:t>
+            </a:r>
+            <a:endParaRPr lang="en-US" altLang="zh-CN" sz="2800" noProof="1"/>
+          </a:p>
+          <a:p>
+            <a:pPr rtl="0"/>
+            <a:r>
+              <a:rPr lang="zh-CN" altLang="en-US" sz="2800" noProof="1"/>
+              <a:t>等待约</a:t>
+            </a:r>
+            <a:r>
+              <a:rPr lang="en-US" altLang="zh-CN" sz="2800" noProof="1"/>
+              <a:t>3</a:t>
+            </a:r>
+            <a:r>
+              <a:rPr lang="zh-CN" altLang="en-US" sz="2800" noProof="1"/>
+              <a:t>分钟</a:t>
+            </a:r>
+            <a:endParaRPr lang="en-US" altLang="zh-CN" sz="2800" noProof="1"/>
+          </a:p>
+          <a:p>
+            <a:r>
+              <a:rPr lang="zh-CN" altLang="en-US" sz="2800" noProof="1"/>
+              <a:t>清洗后的文件将会出现在： </a:t>
+            </a:r>
+            <a:r>
+              <a:rPr lang="en-US" altLang="zh-CN" sz="2800" noProof="1">
+                <a:hlinkClick r:id="rId4" action="ppaction://hlinkfile"/>
+              </a:rPr>
+              <a:t>\\10.10.3.190\std-inv-report-v8\cleanse\cleaned</a:t>
+            </a:r>
+            <a:r>
+              <a:rPr lang="en-US" altLang="zh-CN" sz="2800" noProof="1"/>
+              <a:t> </a:t>
+            </a:r>
+          </a:p>
+          <a:p>
+            <a:pPr rtl="0"/>
+            <a:endParaRPr lang="en-US" altLang="zh-CN" noProof="1"/>
+          </a:p>
+          <a:p>
+            <a:pPr rtl="0"/>
+            <a:endParaRPr lang="en-US" altLang="zh-CN" noProof="1"/>
+          </a:p>
+          <a:p>
+            <a:pPr rtl="0"/>
+            <a:endParaRPr lang="zh-CN" altLang="en-US" noProof="1"/>
+          </a:p>
+        </p:txBody>
+      </p:sp>
+      <p:sp>
+        <p:nvSpPr>
+          <p:cNvPr id="6" name="灯片编号占位符 5">
+            <a:extLst>
+              <a:ext uri="{FF2B5EF4-FFF2-40B4-BE49-F238E27FC236}">
+                <a16:creationId xmlns:a16="http://schemas.microsoft.com/office/drawing/2014/main" id="{CFC0563A-8A2A-4D32-9011-6B5BDB1912B6}"/>
+              </a:ext>
+            </a:extLst>
+          </p:cNvPr>
+          <p:cNvSpPr>
+            <a:spLocks noGrp="1"/>
+          </p:cNvSpPr>
+          <p:nvPr>
+            <p:ph type="sldNum" sz="quarter" idx="11"/>
+          </p:nvPr>
+        </p:nvSpPr>
+        <p:spPr/>
+        <p:txBody>
+          <a:bodyPr rtlCol="0"/>
+          <a:lstStyle/>
+          <a:p>
+            <a:pPr rtl="0"/>
+            <a:fld id="{19B51A1E-902D-48AF-9020-955120F399B6}" type="slidenum">
+              <a:rPr lang="en-US" altLang="zh-CN" smtClean="0"/>
+              <a:pPr rtl="0"/>
+              <a:t>5</a:t>
+            </a:fld>
+            <a:endParaRPr lang="zh-CN" altLang="en-US" dirty="0"/>
+          </a:p>
+        </p:txBody>
+      </p:sp>
+    </p:spTree>
+    <p:extLst>
+      <p:ext uri="{BB962C8B-B14F-4D97-AF65-F5344CB8AC3E}">
+        <p14:creationId xmlns:p14="http://schemas.microsoft.com/office/powerpoint/2010/main" val="3606065264"/>
+      </p:ext>
+    </p:extLst>
+  </p:cSld>
+  <p:clrMapOvr>
+    <a:masterClrMapping/>
+  </p:clrMapOvr>
+</p:sld>
+</file>
+
+<file path=ppt/slides/slide6.xml><?xml version="1.0" encoding="utf-8"?>
 <p:sld xmlns:a="http://schemas.openxmlformats.org/drawingml/2006/main" xmlns:r="http://schemas.openxmlformats.org/officeDocument/2006/relationships" xmlns:p="http://schemas.openxmlformats.org/presentationml/2006/main" showMasterSp="0">
   <p:cSld>
     <p:spTree>
@@ -27208,7 +27691,7 @@
             <a:fld id="{19B51A1E-902D-48AF-9020-955120F399B6}" type="slidenum">
               <a:rPr lang="en-US" altLang="zh-CN" noProof="0" smtClean="0"/>
               <a:pPr rtl="0"/>
-              <a:t>5</a:t>
+              <a:t>6</a:t>
             </a:fld>
             <a:endParaRPr lang="zh-CN" altLang="en-US" noProof="0"/>
           </a:p>
@@ -27301,7 +27784,7 @@
 </p:sld>
 </file>
 
-<file path=ppt/slides/slide6.xml><?xml version="1.0" encoding="utf-8"?>
+<file path=ppt/slides/slide7.xml><?xml version="1.0" encoding="utf-8"?>
 <p:sld xmlns:a="http://schemas.openxmlformats.org/drawingml/2006/main" xmlns:r="http://schemas.openxmlformats.org/officeDocument/2006/relationships" xmlns:p="http://schemas.openxmlformats.org/presentationml/2006/main" showMasterSp="0">
   <p:cSld>
     <p:spTree>
@@ -27343,7 +27826,7 @@
             <a:fld id="{19B51A1E-902D-48AF-9020-955120F399B6}" type="slidenum">
               <a:rPr lang="en-US" altLang="zh-CN" noProof="0" smtClean="0"/>
               <a:pPr rtl="0"/>
-              <a:t>6</a:t>
+              <a:t>7</a:t>
             </a:fld>
             <a:endParaRPr lang="zh-CN" altLang="en-US" noProof="0"/>
           </a:p>
@@ -27435,7 +27918,7 @@
 </p:sld>
 </file>
 
-<file path=ppt/slides/slide7.xml><?xml version="1.0" encoding="utf-8"?>
+<file path=ppt/slides/slide8.xml><?xml version="1.0" encoding="utf-8"?>
 <p:sld xmlns:a="http://schemas.openxmlformats.org/drawingml/2006/main" xmlns:r="http://schemas.openxmlformats.org/officeDocument/2006/relationships" xmlns:p="http://schemas.openxmlformats.org/presentationml/2006/main" showMasterSp="0">
   <p:cSld>
     <p:spTree>
@@ -27927,7 +28410,7 @@
             <a:fld id="{19B51A1E-902D-48AF-9020-955120F399B6}" type="slidenum">
               <a:rPr lang="en-US" altLang="zh-CN" smtClean="0"/>
               <a:pPr rtl="0"/>
-              <a:t>7</a:t>
+              <a:t>8</a:t>
             </a:fld>
             <a:endParaRPr lang="zh-CN" altLang="en-US" dirty="0"/>
           </a:p>
@@ -27981,199 +28464,6 @@
     <p:extLst>
       <p:ext uri="{BB962C8B-B14F-4D97-AF65-F5344CB8AC3E}">
         <p14:creationId xmlns:p14="http://schemas.microsoft.com/office/powerpoint/2010/main" val="4078074862"/>
-      </p:ext>
-    </p:extLst>
-  </p:cSld>
-  <p:clrMapOvr>
-    <a:masterClrMapping/>
-  </p:clrMapOvr>
-</p:sld>
-</file>
-
-<file path=ppt/slides/slide8.xml><?xml version="1.0" encoding="utf-8"?>
-<p:sld xmlns:a="http://schemas.openxmlformats.org/drawingml/2006/main" xmlns:r="http://schemas.openxmlformats.org/officeDocument/2006/relationships" xmlns:p="http://schemas.openxmlformats.org/presentationml/2006/main" showMasterSp="0">
-  <p:cSld>
-    <p:spTree>
-      <p:nvGrpSpPr>
-        <p:cNvPr id="1" name=""/>
-        <p:cNvGrpSpPr/>
-        <p:nvPr/>
-      </p:nvGrpSpPr>
-      <p:grpSpPr>
-        <a:xfrm>
-          <a:off x="0" y="0"/>
-          <a:ext cx="0" cy="0"/>
-          <a:chOff x="0" y="0"/>
-          <a:chExt cx="0" cy="0"/>
-        </a:xfrm>
-      </p:grpSpPr>
-      <p:sp>
-        <p:nvSpPr>
-          <p:cNvPr id="2" name="标题 1">
-            <a:extLst>
-              <a:ext uri="{FF2B5EF4-FFF2-40B4-BE49-F238E27FC236}">
-                <a16:creationId xmlns:a16="http://schemas.microsoft.com/office/drawing/2014/main" id="{30A3821A-C065-4C9A-A138-F7EC9FCB22BC}"/>
-              </a:ext>
-            </a:extLst>
-          </p:cNvPr>
-          <p:cNvSpPr>
-            <a:spLocks noGrp="1"/>
-          </p:cNvSpPr>
-          <p:nvPr>
-            <p:ph type="title"/>
-          </p:nvPr>
-        </p:nvSpPr>
-        <p:spPr/>
-        <p:txBody>
-          <a:bodyPr rtlCol="0"/>
-          <a:lstStyle/>
-          <a:p>
-            <a:pPr rtl="0"/>
-            <a:r>
-              <a:rPr lang="zh-CN" altLang="en-US" dirty="0"/>
-              <a:t>数据分析 </a:t>
-            </a:r>
-            <a:r>
-              <a:rPr lang="en-US" altLang="zh-CN" dirty="0"/>
-              <a:t>– </a:t>
-            </a:r>
-            <a:r>
-              <a:rPr lang="zh-CN" altLang="en-US" dirty="0"/>
-              <a:t>操作步骤</a:t>
-            </a:r>
-          </a:p>
-        </p:txBody>
-      </p:sp>
-      <p:sp>
-        <p:nvSpPr>
-          <p:cNvPr id="4" name="内容占位符 3">
-            <a:extLst>
-              <a:ext uri="{FF2B5EF4-FFF2-40B4-BE49-F238E27FC236}">
-                <a16:creationId xmlns:a16="http://schemas.microsoft.com/office/drawing/2014/main" id="{23E57B19-FD04-41F8-BAD3-71E46BBEA649}"/>
-              </a:ext>
-            </a:extLst>
-          </p:cNvPr>
-          <p:cNvSpPr>
-            <a:spLocks noGrp="1"/>
-          </p:cNvSpPr>
-          <p:nvPr>
-            <p:ph sz="half" idx="2"/>
-          </p:nvPr>
-        </p:nvSpPr>
-        <p:spPr>
-          <a:xfrm>
-            <a:off x="432000" y="1241947"/>
-            <a:ext cx="11340000" cy="3462172"/>
-          </a:xfrm>
-        </p:spPr>
-        <p:txBody>
-          <a:bodyPr rtlCol="0"/>
-          <a:lstStyle/>
-          <a:p>
-            <a:r>
-              <a:rPr lang="zh-CN" altLang="en-US" sz="2800" noProof="1"/>
-              <a:t>打开共享目录：</a:t>
-            </a:r>
-            <a:r>
-              <a:rPr lang="en-US" altLang="zh-CN" sz="2800" noProof="1">
-                <a:hlinkClick r:id="rId3" action="ppaction://hlinkfile"/>
-              </a:rPr>
-              <a:t>\\10.10.3.190\std-inv-report-v8\analysis\cleaned</a:t>
-            </a:r>
-            <a:r>
-              <a:rPr lang="zh-CN" altLang="en-US" sz="2800" noProof="1"/>
-              <a:t> </a:t>
-            </a:r>
-            <a:endParaRPr lang="en-US" altLang="zh-CN" sz="2800" noProof="1"/>
-          </a:p>
-          <a:p>
-            <a:r>
-              <a:rPr lang="zh-CN" altLang="en-US" sz="2800" noProof="1"/>
-              <a:t>粘贴或者拖拽需要分析的已清洗数据文件至上述目录</a:t>
-            </a:r>
-            <a:endParaRPr lang="en-US" altLang="zh-CN" sz="2800" noProof="1"/>
-          </a:p>
-          <a:p>
-            <a:pPr rtl="0"/>
-            <a:r>
-              <a:rPr lang="zh-CN" altLang="en-US" sz="2800" noProof="1"/>
-              <a:t>等待约</a:t>
-            </a:r>
-            <a:r>
-              <a:rPr lang="en-US" altLang="zh-CN" sz="2800" noProof="1"/>
-              <a:t>3</a:t>
-            </a:r>
-            <a:r>
-              <a:rPr lang="zh-CN" altLang="en-US" sz="2800" noProof="1"/>
-              <a:t>分钟</a:t>
-            </a:r>
-            <a:endParaRPr lang="en-US" altLang="zh-CN" sz="2800" noProof="1"/>
-          </a:p>
-          <a:p>
-            <a:r>
-              <a:rPr lang="zh-CN" altLang="en-US" sz="2800" noProof="1"/>
-              <a:t>清洗后的文件将会出现在： </a:t>
-            </a:r>
-            <a:r>
-              <a:rPr lang="en-US" altLang="zh-CN" sz="2800" noProof="1">
-                <a:hlinkClick r:id="rId4" action="ppaction://hlinkfile"/>
-              </a:rPr>
-              <a:t>\\10.10.3.190\std-inv-report-v8\analysis\result</a:t>
-            </a:r>
-            <a:r>
-              <a:rPr lang="en-US" altLang="zh-CN" sz="2800" noProof="1"/>
-              <a:t> </a:t>
-            </a:r>
-          </a:p>
-          <a:p>
-            <a:pPr rtl="0"/>
-            <a:endParaRPr lang="en-US" altLang="zh-CN" noProof="1"/>
-          </a:p>
-          <a:p>
-            <a:pPr rtl="0"/>
-            <a:endParaRPr lang="en-US" altLang="zh-CN" noProof="1"/>
-          </a:p>
-          <a:p>
-            <a:pPr rtl="0"/>
-            <a:endParaRPr lang="zh-CN" altLang="en-US" noProof="1"/>
-          </a:p>
-        </p:txBody>
-      </p:sp>
-      <p:sp>
-        <p:nvSpPr>
-          <p:cNvPr id="6" name="灯片编号占位符 5">
-            <a:extLst>
-              <a:ext uri="{FF2B5EF4-FFF2-40B4-BE49-F238E27FC236}">
-                <a16:creationId xmlns:a16="http://schemas.microsoft.com/office/drawing/2014/main" id="{CFC0563A-8A2A-4D32-9011-6B5BDB1912B6}"/>
-              </a:ext>
-            </a:extLst>
-          </p:cNvPr>
-          <p:cNvSpPr>
-            <a:spLocks noGrp="1"/>
-          </p:cNvSpPr>
-          <p:nvPr>
-            <p:ph type="sldNum" sz="quarter" idx="11"/>
-          </p:nvPr>
-        </p:nvSpPr>
-        <p:spPr/>
-        <p:txBody>
-          <a:bodyPr rtlCol="0"/>
-          <a:lstStyle/>
-          <a:p>
-            <a:pPr rtl="0"/>
-            <a:fld id="{19B51A1E-902D-48AF-9020-955120F399B6}" type="slidenum">
-              <a:rPr lang="en-US" altLang="zh-CN" smtClean="0"/>
-              <a:pPr rtl="0"/>
-              <a:t>8</a:t>
-            </a:fld>
-            <a:endParaRPr lang="zh-CN" altLang="en-US" dirty="0"/>
-          </a:p>
-        </p:txBody>
-      </p:sp>
-    </p:spTree>
-    <p:extLst>
-      <p:ext uri="{BB962C8B-B14F-4D97-AF65-F5344CB8AC3E}">
-        <p14:creationId xmlns:p14="http://schemas.microsoft.com/office/powerpoint/2010/main" val="3770955530"/>
       </p:ext>
     </p:extLst>
   </p:cSld>
@@ -28202,10 +28492,142 @@
       </p:grpSpPr>
       <p:sp>
         <p:nvSpPr>
+          <p:cNvPr id="2" name="标题 1">
+            <a:extLst>
+              <a:ext uri="{FF2B5EF4-FFF2-40B4-BE49-F238E27FC236}">
+                <a16:creationId xmlns:a16="http://schemas.microsoft.com/office/drawing/2014/main" id="{30A3821A-C065-4C9A-A138-F7EC9FCB22BC}"/>
+              </a:ext>
+            </a:extLst>
+          </p:cNvPr>
+          <p:cNvSpPr>
+            <a:spLocks noGrp="1"/>
+          </p:cNvSpPr>
+          <p:nvPr>
+            <p:ph type="title"/>
+          </p:nvPr>
+        </p:nvSpPr>
+        <p:spPr/>
+        <p:txBody>
+          <a:bodyPr rtlCol="0"/>
+          <a:lstStyle/>
+          <a:p>
+            <a:pPr rtl="0"/>
+            <a:r>
+              <a:rPr lang="zh-CN" altLang="en-US" dirty="0"/>
+              <a:t>数据分析 </a:t>
+            </a:r>
+            <a:r>
+              <a:rPr lang="en-US" altLang="zh-CN" dirty="0"/>
+              <a:t>– </a:t>
+            </a:r>
+            <a:r>
+              <a:rPr lang="zh-CN" altLang="en-US" dirty="0"/>
+              <a:t>操作步骤</a:t>
+            </a:r>
+          </a:p>
+        </p:txBody>
+      </p:sp>
+      <p:sp>
+        <p:nvSpPr>
+          <p:cNvPr id="4" name="内容占位符 3">
+            <a:extLst>
+              <a:ext uri="{FF2B5EF4-FFF2-40B4-BE49-F238E27FC236}">
+                <a16:creationId xmlns:a16="http://schemas.microsoft.com/office/drawing/2014/main" id="{23E57B19-FD04-41F8-BAD3-71E46BBEA649}"/>
+              </a:ext>
+            </a:extLst>
+          </p:cNvPr>
+          <p:cNvSpPr>
+            <a:spLocks noGrp="1"/>
+          </p:cNvSpPr>
+          <p:nvPr>
+            <p:ph sz="half" idx="2"/>
+          </p:nvPr>
+        </p:nvSpPr>
+        <p:spPr>
+          <a:xfrm>
+            <a:off x="432000" y="1241947"/>
+            <a:ext cx="11340000" cy="3462172"/>
+          </a:xfrm>
+        </p:spPr>
+        <p:txBody>
+          <a:bodyPr rtlCol="0"/>
+          <a:lstStyle/>
+          <a:p>
+            <a:r>
+              <a:rPr lang="zh-CN" altLang="en-US" sz="2800" noProof="1"/>
+              <a:t>打开共享目录：</a:t>
+            </a:r>
+            <a:r>
+              <a:rPr lang="en-US" altLang="zh-CN" sz="2800" noProof="1">
+                <a:hlinkClick r:id="rId3" action="ppaction://hlinkfile"/>
+              </a:rPr>
+              <a:t>\\10.10.3.190\std-inv-report-v8\analysis\cleaned</a:t>
+            </a:r>
+            <a:r>
+              <a:rPr lang="zh-CN" altLang="en-US" sz="2800" noProof="1"/>
+              <a:t> </a:t>
+            </a:r>
+            <a:endParaRPr lang="en-US" altLang="zh-CN" sz="2800" noProof="1"/>
+          </a:p>
+          <a:p>
+            <a:r>
+              <a:rPr lang="zh-CN" altLang="en-US" sz="2800" noProof="1"/>
+              <a:t>粘贴或者拖拽需要分析的已清洗数据文件至上述目录</a:t>
+            </a:r>
+            <a:endParaRPr lang="en-US" altLang="zh-CN" sz="2800" noProof="1"/>
+          </a:p>
+          <a:p>
+            <a:pPr rtl="0"/>
+            <a:r>
+              <a:rPr lang="zh-CN" altLang="en-US" sz="2800" noProof="1"/>
+              <a:t>等待约</a:t>
+            </a:r>
+            <a:r>
+              <a:rPr lang="en-US" altLang="zh-CN" sz="2800" noProof="1"/>
+              <a:t>3</a:t>
+            </a:r>
+            <a:r>
+              <a:rPr lang="zh-CN" altLang="en-US" sz="2800" noProof="1"/>
+              <a:t>分钟</a:t>
+            </a:r>
+            <a:endParaRPr lang="en-US" altLang="zh-CN" sz="2800" noProof="1"/>
+          </a:p>
+          <a:p>
+            <a:r>
+              <a:rPr lang="zh-CN" altLang="en-US" sz="2800" noProof="1"/>
+              <a:t>清洗后的文件将会出现在： </a:t>
+            </a:r>
+            <a:r>
+              <a:rPr lang="en-US" altLang="zh-CN" sz="2800" noProof="1">
+                <a:hlinkClick r:id="rId4" action="ppaction://hlinkfile"/>
+              </a:rPr>
+              <a:t>\\10.10.3.190\std-inv-report-v8\analysis\result</a:t>
+            </a:r>
+            <a:r>
+              <a:rPr lang="en-US" altLang="zh-CN" sz="2800" noProof="1"/>
+              <a:t> </a:t>
+            </a:r>
+          </a:p>
+          <a:p>
+            <a:pPr rtl="0"/>
+            <a:endParaRPr lang="en-US" altLang="zh-CN" noProof="1"/>
+          </a:p>
+          <a:p>
+            <a:pPr rtl="0"/>
+            <a:endParaRPr lang="en-US" altLang="zh-CN" noProof="1"/>
+          </a:p>
+          <a:p>
+            <a:pPr rtl="0"/>
+            <a:endParaRPr lang="zh-CN" altLang="en-US" noProof="1"/>
+          </a:p>
+        </p:txBody>
+      </p:sp>
+      <p:sp>
+        <p:nvSpPr>
           <p:cNvPr id="6" name="灯片编号占位符 5">
             <a:extLst>
               <a:ext uri="{FF2B5EF4-FFF2-40B4-BE49-F238E27FC236}">
-                <a16:creationId xmlns:a16="http://schemas.microsoft.com/office/drawing/2014/main" id="{871A3CDD-79E0-4A33-8FED-82CEF7148793}"/>
+                <a16:creationId xmlns:a16="http://schemas.microsoft.com/office/drawing/2014/main" id="{CFC0563A-8A2A-4D32-9011-6B5BDB1912B6}"/>
               </a:ext>
             </a:extLst>
           </p:cNvPr>
@@ -28218,97 +28640,23 @@
         </p:nvSpPr>
         <p:spPr/>
         <p:txBody>
-          <a:bodyPr/>
+          <a:bodyPr rtlCol="0"/>
           <a:lstStyle/>
           <a:p>
             <a:pPr rtl="0"/>
             <a:fld id="{19B51A1E-902D-48AF-9020-955120F399B6}" type="slidenum">
-              <a:rPr lang="en-US" altLang="zh-CN" noProof="0" smtClean="0"/>
+              <a:rPr lang="en-US" altLang="zh-CN" smtClean="0"/>
               <a:pPr rtl="0"/>
               <a:t>9</a:t>
             </a:fld>
-            <a:endParaRPr lang="zh-CN" altLang="en-US" noProof="0"/>
-          </a:p>
-        </p:txBody>
-      </p:sp>
-      <p:sp>
-        <p:nvSpPr>
-          <p:cNvPr id="9" name="标题 8">
-            <a:extLst>
-              <a:ext uri="{FF2B5EF4-FFF2-40B4-BE49-F238E27FC236}">
-                <a16:creationId xmlns:a16="http://schemas.microsoft.com/office/drawing/2014/main" id="{EDBAD69E-6195-4630-B588-0130453607E8}"/>
-              </a:ext>
-            </a:extLst>
-          </p:cNvPr>
-          <p:cNvSpPr>
-            <a:spLocks noGrp="1"/>
-          </p:cNvSpPr>
-          <p:nvPr>
-            <p:ph type="title"/>
-          </p:nvPr>
-        </p:nvSpPr>
-        <p:spPr>
-          <a:xfrm>
-            <a:off x="426000" y="369310"/>
-            <a:ext cx="11340000" cy="1291191"/>
-          </a:xfrm>
-        </p:spPr>
-        <p:txBody>
-          <a:bodyPr/>
-          <a:lstStyle/>
-          <a:p>
-            <a:r>
-              <a:rPr lang="zh-CN" altLang="en-US" noProof="1"/>
-              <a:t>粘贴或者拖拽需要分析的已清洗数据文件至：</a:t>
-            </a:r>
-            <a:r>
-              <a:rPr lang="en-US" altLang="zh-CN" noProof="1">
-                <a:hlinkClick r:id="rId2" action="ppaction://hlinkfile"/>
-              </a:rPr>
-              <a:t>\\10.10.3.190\std-inv-report-v8\analysis\cleaned</a:t>
-            </a:r>
-            <a:r>
-              <a:rPr lang="en-US" altLang="zh-CN" noProof="1"/>
-              <a:t> </a:t>
-            </a:r>
-            <a:endParaRPr lang="en-US" dirty="0"/>
-          </a:p>
-        </p:txBody>
-      </p:sp>
-      <p:pic>
-        <p:nvPicPr>
-          <p:cNvPr id="2" name="图片 1">
-            <a:extLst>
-              <a:ext uri="{FF2B5EF4-FFF2-40B4-BE49-F238E27FC236}">
-                <a16:creationId xmlns:a16="http://schemas.microsoft.com/office/drawing/2014/main" id="{82A9AA36-3D3D-47F4-8CD7-8A5F48C67818}"/>
-              </a:ext>
-            </a:extLst>
-          </p:cNvPr>
-          <p:cNvPicPr>
-            <a:picLocks noChangeAspect="1"/>
-          </p:cNvPicPr>
-          <p:nvPr/>
-        </p:nvPicPr>
-        <p:blipFill>
-          <a:blip r:embed="rId3"/>
-          <a:stretch>
-            <a:fillRect/>
-          </a:stretch>
-        </p:blipFill>
-        <p:spPr>
-          <a:xfrm>
-            <a:off x="1298775" y="1660501"/>
-            <a:ext cx="9906000" cy="3810000"/>
-          </a:xfrm>
-          <a:prstGeom prst="rect">
-            <a:avLst/>
-          </a:prstGeom>
-        </p:spPr>
-      </p:pic>
+            <a:endParaRPr lang="zh-CN" altLang="en-US" dirty="0"/>
+          </a:p>
+        </p:txBody>
+      </p:sp>
     </p:spTree>
     <p:extLst>
       <p:ext uri="{BB962C8B-B14F-4D97-AF65-F5344CB8AC3E}">
-        <p14:creationId xmlns:p14="http://schemas.microsoft.com/office/powerpoint/2010/main" val="3022294158"/>
+        <p14:creationId xmlns:p14="http://schemas.microsoft.com/office/powerpoint/2010/main" val="3770955530"/>
       </p:ext>
     </p:extLst>
   </p:cSld>
@@ -29207,15 +29555,6 @@
 </file>
 
 <file path=customXml/item1.xml><?xml version="1.0" encoding="utf-8"?>
-<p:properties xmlns:p="http://schemas.microsoft.com/office/2006/metadata/properties" xmlns:xsi="http://www.w3.org/2001/XMLSchema-instance" xmlns:pc="http://schemas.microsoft.com/office/infopath/2007/PartnerControls">
-  <documentManagement>
-    <_ip_UnifiedCompliancePolicyUIAction xmlns="http://schemas.microsoft.com/sharepoint/v3" xsi:nil="true"/>
-    <_ip_UnifiedCompliancePolicyProperties xmlns="http://schemas.microsoft.com/sharepoint/v3" xsi:nil="true"/>
-  </documentManagement>
-</p:properties>
-</file>
-
-<file path=customXml/item2.xml><?xml version="1.0" encoding="utf-8"?>
 <ct:contentTypeSchema xmlns:ct="http://schemas.microsoft.com/office/2006/metadata/contentType" xmlns:ma="http://schemas.microsoft.com/office/2006/metadata/properties/metaAttributes" ct:_="" ma:_="" ma:contentTypeName="Document" ma:contentTypeID="0x010100DEEA25CC0A0AC24199CDC46C25B8B0BC" ma:contentTypeVersion="9" ma:contentTypeDescription="Create a new document." ma:contentTypeScope="" ma:versionID="76e25e1730b4532ab1d5e5b131a96a5a">
   <xsd:schema xmlns:xsd="http://www.w3.org/2001/XMLSchema" xmlns:xs="http://www.w3.org/2001/XMLSchema" xmlns:p="http://schemas.microsoft.com/office/2006/metadata/properties" xmlns:ns1="http://schemas.microsoft.com/sharepoint/v3" xmlns:ns2="6dc4bcd6-49db-4c07-9060-8acfc67cef9f" xmlns:ns3="fb0879af-3eba-417a-a55a-ffe6dcd6ca77" targetNamespace="http://schemas.microsoft.com/office/2006/metadata/properties" ma:root="true" ma:fieldsID="ad1e9281a84c4949647088091c718de3" ns1:_="" ns2:_="" ns3:_="">
     <xsd:import namespace="http://schemas.microsoft.com/sharepoint/v3"/>
@@ -29417,25 +29756,16 @@
 </ct:contentTypeSchema>
 </file>
 
-<file path=customXml/itemProps1.xml><?xml version="1.0" encoding="utf-8"?>
-<ds:datastoreItem xmlns:ds="http://schemas.openxmlformats.org/officeDocument/2006/customXml" ds:itemID="{0543E42B-7C8A-4AB1-9F29-E7D83A36D5D6}">
-  <ds:schemaRefs>
-    <ds:schemaRef ds:uri="http://purl.org/dc/terms/"/>
-    <ds:schemaRef ds:uri="http://schemas.microsoft.com/office/2006/metadata/properties"/>
-    <ds:schemaRef ds:uri="http://purl.org/dc/dcmitype/"/>
-    <ds:schemaRef ds:uri="http://purl.org/dc/elements/1.1/"/>
-    <ds:schemaRef ds:uri="http://schemas.openxmlformats.org/package/2006/metadata/core-properties"/>
-    <ds:schemaRef ds:uri="fb0879af-3eba-417a-a55a-ffe6dcd6ca77"/>
-    <ds:schemaRef ds:uri="6dc4bcd6-49db-4c07-9060-8acfc67cef9f"/>
-    <ds:schemaRef ds:uri="http://schemas.microsoft.com/office/2006/documentManagement/types"/>
-    <ds:schemaRef ds:uri="http://schemas.microsoft.com/office/infopath/2007/PartnerControls"/>
-    <ds:schemaRef ds:uri="http://schemas.microsoft.com/sharepoint/v3"/>
-    <ds:schemaRef ds:uri="http://www.w3.org/XML/1998/namespace"/>
-  </ds:schemaRefs>
-</ds:datastoreItem>
+<file path=customXml/item2.xml><?xml version="1.0" encoding="utf-8"?>
+<p:properties xmlns:p="http://schemas.microsoft.com/office/2006/metadata/properties" xmlns:xsi="http://www.w3.org/2001/XMLSchema-instance" xmlns:pc="http://schemas.microsoft.com/office/infopath/2007/PartnerControls">
+  <documentManagement>
+    <_ip_UnifiedCompliancePolicyUIAction xmlns="http://schemas.microsoft.com/sharepoint/v3" xsi:nil="true"/>
+    <_ip_UnifiedCompliancePolicyProperties xmlns="http://schemas.microsoft.com/sharepoint/v3" xsi:nil="true"/>
+  </documentManagement>
+</p:properties>
 </file>
 
-<file path=customXml/itemProps2.xml><?xml version="1.0" encoding="utf-8"?>
+<file path=customXml/itemProps1.xml><?xml version="1.0" encoding="utf-8"?>
 <ds:datastoreItem xmlns:ds="http://schemas.openxmlformats.org/officeDocument/2006/customXml" ds:itemID="{0F655827-7CC1-40B1-BA1C-E9676D7EEDB7}">
   <ds:schemaRefs>
     <ds:schemaRef ds:uri="http://schemas.microsoft.com/office/2006/metadata/contentType"/>
@@ -29453,4 +29783,22 @@
     <ds:schemaRef ds:uri="http://schemas.microsoft.com/internal/obd"/>
   </ds:schemaRefs>
 </ds:datastoreItem>
+</file>
+
+<file path=customXml/itemProps2.xml><?xml version="1.0" encoding="utf-8"?>
+<ds:datastoreItem xmlns:ds="http://schemas.openxmlformats.org/officeDocument/2006/customXml" ds:itemID="{0543E42B-7C8A-4AB1-9F29-E7D83A36D5D6}">
+  <ds:schemaRefs>
+    <ds:schemaRef ds:uri="http://purl.org/dc/terms/"/>
+    <ds:schemaRef ds:uri="http://schemas.microsoft.com/office/2006/metadata/properties"/>
+    <ds:schemaRef ds:uri="http://purl.org/dc/dcmitype/"/>
+    <ds:schemaRef ds:uri="http://purl.org/dc/elements/1.1/"/>
+    <ds:schemaRef ds:uri="http://schemas.openxmlformats.org/package/2006/metadata/core-properties"/>
+    <ds:schemaRef ds:uri="fb0879af-3eba-417a-a55a-ffe6dcd6ca77"/>
+    <ds:schemaRef ds:uri="6dc4bcd6-49db-4c07-9060-8acfc67cef9f"/>
+    <ds:schemaRef ds:uri="http://schemas.microsoft.com/office/2006/documentManagement/types"/>
+    <ds:schemaRef ds:uri="http://schemas.microsoft.com/office/infopath/2007/PartnerControls"/>
+    <ds:schemaRef ds:uri="http://schemas.microsoft.com/sharepoint/v3"/>
+    <ds:schemaRef ds:uri="http://www.w3.org/XML/1998/namespace"/>
+  </ds:schemaRefs>
+</ds:datastoreItem>
 </file>
</xml_diff>